<commit_message>
Actualizando Seccion 6 Diapos
</commit_message>
<xml_diff>
--- a/Seccion 6 Analisis Factorial/Diapositivas/6.2 Modelo Factorial.pptx
+++ b/Seccion 6 Analisis Factorial/Diapositivas/6.2 Modelo Factorial.pptx
@@ -278,7 +278,7 @@
             <a:fld id="{B61BEF0D-F0BB-DE4B-95CE-6DB70DBA9567}" type="datetimeFigureOut">
               <a:rPr lang="en-US" smtClean="0"/>
               <a:pPr/>
-              <a:t>1/25/2020</a:t>
+              <a:t>4/6/2020</a:t>
             </a:fld>
             <a:endParaRPr lang="en-US" dirty="0"/>
           </a:p>
@@ -477,7 +477,7 @@
           <a:p>
             <a:fld id="{55C6B4A9-1611-4792-9094-5F34BCA07E0B}" type="datetimeFigureOut">
               <a:rPr lang="en-US" smtClean="0"/>
-              <a:t>1/25/2020</a:t>
+              <a:t>4/6/2020</a:t>
             </a:fld>
             <a:endParaRPr lang="en-US" dirty="0"/>
           </a:p>
@@ -686,7 +686,7 @@
             <a:fld id="{B61BEF0D-F0BB-DE4B-95CE-6DB70DBA9567}" type="datetimeFigureOut">
               <a:rPr lang="en-US" smtClean="0"/>
               <a:pPr/>
-              <a:t>1/25/2020</a:t>
+              <a:t>4/6/2020</a:t>
             </a:fld>
             <a:endParaRPr lang="en-US" dirty="0"/>
           </a:p>
@@ -1506,7 +1506,7 @@
             <a:fld id="{B61BEF0D-F0BB-DE4B-95CE-6DB70DBA9567}" type="datetimeFigureOut">
               <a:rPr lang="en-US" smtClean="0"/>
               <a:pPr/>
-              <a:t>1/25/2020</a:t>
+              <a:t>4/6/2020</a:t>
             </a:fld>
             <a:endParaRPr lang="en-US" dirty="0"/>
           </a:p>
@@ -1678,7 +1678,7 @@
             <a:fld id="{B61BEF0D-F0BB-DE4B-95CE-6DB70DBA9567}" type="datetimeFigureOut">
               <a:rPr lang="en-US" smtClean="0"/>
               <a:pPr/>
-              <a:t>1/25/2020</a:t>
+              <a:t>4/6/2020</a:t>
             </a:fld>
             <a:endParaRPr lang="en-US" dirty="0"/>
           </a:p>
@@ -1927,7 +1927,7 @@
             <a:fld id="{B61BEF0D-F0BB-DE4B-95CE-6DB70DBA9567}" type="datetimeFigureOut">
               <a:rPr lang="en-US" smtClean="0"/>
               <a:pPr/>
-              <a:t>1/25/2020</a:t>
+              <a:t>4/6/2020</a:t>
             </a:fld>
             <a:endParaRPr lang="en-US" dirty="0"/>
           </a:p>
@@ -2160,7 +2160,7 @@
           <a:p>
             <a:fld id="{EB712588-04B1-427B-82EE-E8DB90309F08}" type="datetimeFigureOut">
               <a:rPr lang="en-US" smtClean="0"/>
-              <a:t>1/25/2020</a:t>
+              <a:t>4/6/2020</a:t>
             </a:fld>
             <a:endParaRPr lang="en-US" dirty="0"/>
           </a:p>
@@ -2535,7 +2535,7 @@
             <a:fld id="{B61BEF0D-F0BB-DE4B-95CE-6DB70DBA9567}" type="datetimeFigureOut">
               <a:rPr lang="en-US" smtClean="0"/>
               <a:pPr/>
-              <a:t>1/25/2020</a:t>
+              <a:t>4/6/2020</a:t>
             </a:fld>
             <a:endParaRPr lang="en-US" dirty="0"/>
           </a:p>
@@ -2660,7 +2660,7 @@
             <a:fld id="{B61BEF0D-F0BB-DE4B-95CE-6DB70DBA9567}" type="datetimeFigureOut">
               <a:rPr lang="en-US" smtClean="0"/>
               <a:pPr/>
-              <a:t>1/25/2020</a:t>
+              <a:t>4/6/2020</a:t>
             </a:fld>
             <a:endParaRPr lang="en-US" dirty="0"/>
           </a:p>
@@ -2757,7 +2757,7 @@
             <a:fld id="{B61BEF0D-F0BB-DE4B-95CE-6DB70DBA9567}" type="datetimeFigureOut">
               <a:rPr lang="en-US" smtClean="0"/>
               <a:pPr/>
-              <a:t>1/25/2020</a:t>
+              <a:t>4/6/2020</a:t>
             </a:fld>
             <a:endParaRPr lang="en-US" dirty="0"/>
           </a:p>
@@ -3013,7 +3013,7 @@
           <a:p>
             <a:fld id="{42A54C80-263E-416B-A8E0-580EDEADCBDC}" type="datetimeFigureOut">
               <a:rPr lang="en-US" smtClean="0"/>
-              <a:t>1/25/2020</a:t>
+              <a:t>4/6/2020</a:t>
             </a:fld>
             <a:endParaRPr lang="en-US" dirty="0"/>
           </a:p>
@@ -3200,7 +3200,7 @@
             <a:fld id="{B61BEF0D-F0BB-DE4B-95CE-6DB70DBA9567}" type="datetimeFigureOut">
               <a:rPr lang="en-US" smtClean="0"/>
               <a:pPr/>
-              <a:t>1/25/2020</a:t>
+              <a:t>4/6/2020</a:t>
             </a:fld>
             <a:endParaRPr lang="en-US" dirty="0"/>
           </a:p>
@@ -3520,7 +3520,7 @@
             <a:fld id="{B61BEF0D-F0BB-DE4B-95CE-6DB70DBA9567}" type="datetimeFigureOut">
               <a:rPr lang="en-US" smtClean="0"/>
               <a:pPr/>
-              <a:t>1/25/2020</a:t>
+              <a:t>4/6/2020</a:t>
             </a:fld>
             <a:endParaRPr lang="en-US" dirty="0"/>
           </a:p>
@@ -3730,7 +3730,7 @@
             <a:fld id="{B61BEF0D-F0BB-DE4B-95CE-6DB70DBA9567}" type="datetimeFigureOut">
               <a:rPr lang="en-US" smtClean="0"/>
               <a:pPr/>
-              <a:t>1/25/2020</a:t>
+              <a:t>4/6/2020</a:t>
             </a:fld>
             <a:endParaRPr lang="en-US" dirty="0"/>
           </a:p>
@@ -4046,7 +4046,7 @@
             <a:fld id="{B61BEF0D-F0BB-DE4B-95CE-6DB70DBA9567}" type="datetimeFigureOut">
               <a:rPr lang="en-US" smtClean="0"/>
               <a:pPr/>
-              <a:t>1/25/2020</a:t>
+              <a:t>4/6/2020</a:t>
             </a:fld>
             <a:endParaRPr lang="en-US" dirty="0"/>
           </a:p>
@@ -4381,7 +4381,7 @@
             <a:fld id="{B61BEF0D-F0BB-DE4B-95CE-6DB70DBA9567}" type="datetimeFigureOut">
               <a:rPr lang="en-US" smtClean="0"/>
               <a:pPr/>
-              <a:t>1/25/2020</a:t>
+              <a:t>4/6/2020</a:t>
             </a:fld>
             <a:endParaRPr lang="en-US" dirty="0"/>
           </a:p>
@@ -4697,7 +4697,7 @@
             <a:fld id="{B61BEF0D-F0BB-DE4B-95CE-6DB70DBA9567}" type="datetimeFigureOut">
               <a:rPr lang="en-US" smtClean="0"/>
               <a:pPr/>
-              <a:t>1/25/2020</a:t>
+              <a:t>4/6/2020</a:t>
             </a:fld>
             <a:endParaRPr lang="en-US" dirty="0"/>
           </a:p>
@@ -5092,7 +5092,7 @@
             <a:fld id="{B61BEF0D-F0BB-DE4B-95CE-6DB70DBA9567}" type="datetimeFigureOut">
               <a:rPr lang="en-US" smtClean="0"/>
               <a:pPr/>
-              <a:t>1/25/2020</a:t>
+              <a:t>4/6/2020</a:t>
             </a:fld>
             <a:endParaRPr lang="en-US" dirty="0"/>
           </a:p>
@@ -5263,7 +5263,7 @@
           <a:p>
             <a:fld id="{55C6B4A9-1611-4792-9094-5F34BCA07E0B}" type="datetimeFigureOut">
               <a:rPr lang="en-US" smtClean="0"/>
-              <a:t>1/25/2020</a:t>
+              <a:t>4/6/2020</a:t>
             </a:fld>
             <a:endParaRPr lang="en-US" dirty="0"/>
           </a:p>
@@ -5444,7 +5444,7 @@
             <a:fld id="{B61BEF0D-F0BB-DE4B-95CE-6DB70DBA9567}" type="datetimeFigureOut">
               <a:rPr lang="en-US" smtClean="0"/>
               <a:pPr/>
-              <a:t>1/25/2020</a:t>
+              <a:t>4/6/2020</a:t>
             </a:fld>
             <a:endParaRPr lang="en-US" dirty="0"/>
           </a:p>
@@ -5709,7 +5709,7 @@
             <a:fld id="{B61BEF0D-F0BB-DE4B-95CE-6DB70DBA9567}" type="datetimeFigureOut">
               <a:rPr lang="en-US" smtClean="0"/>
               <a:pPr/>
-              <a:t>1/25/2020</a:t>
+              <a:t>4/6/2020</a:t>
             </a:fld>
             <a:endParaRPr lang="en-US" dirty="0"/>
           </a:p>
@@ -5975,7 +5975,7 @@
           <a:p>
             <a:fld id="{EB712588-04B1-427B-82EE-E8DB90309F08}" type="datetimeFigureOut">
               <a:rPr lang="en-US" smtClean="0"/>
-              <a:t>1/25/2020</a:t>
+              <a:t>4/6/2020</a:t>
             </a:fld>
             <a:endParaRPr lang="en-US" dirty="0"/>
           </a:p>
@@ -6388,7 +6388,7 @@
             <a:fld id="{B61BEF0D-F0BB-DE4B-95CE-6DB70DBA9567}" type="datetimeFigureOut">
               <a:rPr lang="en-US" smtClean="0"/>
               <a:pPr/>
-              <a:t>1/25/2020</a:t>
+              <a:t>4/6/2020</a:t>
             </a:fld>
             <a:endParaRPr lang="en-US" dirty="0"/>
           </a:p>
@@ -6531,7 +6531,7 @@
             <a:fld id="{B61BEF0D-F0BB-DE4B-95CE-6DB70DBA9567}" type="datetimeFigureOut">
               <a:rPr lang="en-US" smtClean="0"/>
               <a:pPr/>
-              <a:t>1/25/2020</a:t>
+              <a:t>4/6/2020</a:t>
             </a:fld>
             <a:endParaRPr lang="en-US" dirty="0"/>
           </a:p>
@@ -6646,7 +6646,7 @@
             <a:fld id="{B61BEF0D-F0BB-DE4B-95CE-6DB70DBA9567}" type="datetimeFigureOut">
               <a:rPr lang="en-US" smtClean="0"/>
               <a:pPr/>
-              <a:t>1/25/2020</a:t>
+              <a:t>4/6/2020</a:t>
             </a:fld>
             <a:endParaRPr lang="en-US" dirty="0"/>
           </a:p>
@@ -6958,7 +6958,7 @@
           <a:p>
             <a:fld id="{42A54C80-263E-416B-A8E0-580EDEADCBDC}" type="datetimeFigureOut">
               <a:rPr lang="en-US" smtClean="0"/>
-              <a:t>1/25/2020</a:t>
+              <a:t>4/6/2020</a:t>
             </a:fld>
             <a:endParaRPr lang="en-US" dirty="0"/>
           </a:p>
@@ -7247,7 +7247,7 @@
             <a:fld id="{B61BEF0D-F0BB-DE4B-95CE-6DB70DBA9567}" type="datetimeFigureOut">
               <a:rPr lang="en-US" smtClean="0"/>
               <a:pPr/>
-              <a:t>1/25/2020</a:t>
+              <a:t>4/6/2020</a:t>
             </a:fld>
             <a:endParaRPr lang="en-US" dirty="0"/>
           </a:p>
@@ -7490,7 +7490,7 @@
             <a:fld id="{B61BEF0D-F0BB-DE4B-95CE-6DB70DBA9567}" type="datetimeFigureOut">
               <a:rPr lang="en-US" smtClean="0"/>
               <a:pPr/>
-              <a:t>1/25/2020</a:t>
+              <a:t>4/6/2020</a:t>
             </a:fld>
             <a:endParaRPr lang="en-US" dirty="0"/>
           </a:p>
@@ -8575,7 +8575,7 @@
             <a:fld id="{B61BEF0D-F0BB-DE4B-95CE-6DB70DBA9567}" type="datetimeFigureOut">
               <a:rPr lang="en-US" smtClean="0"/>
               <a:pPr/>
-              <a:t>1/25/2020</a:t>
+              <a:t>4/6/2020</a:t>
             </a:fld>
             <a:endParaRPr lang="en-US" dirty="0"/>
           </a:p>
@@ -10659,8 +10659,8 @@
           </a:p>
         </p:txBody>
       </p:sp>
-      <mc:AlternateContent xmlns:mc="http://schemas.openxmlformats.org/markup-compatibility/2006">
-        <mc:Choice xmlns:a14="http://schemas.microsoft.com/office/drawing/2010/main" Requires="a14">
+      <mc:AlternateContent xmlns:mc="http://schemas.openxmlformats.org/markup-compatibility/2006" xmlns:a14="http://schemas.microsoft.com/office/drawing/2010/main">
+        <mc:Choice Requires="a14">
           <p:sp>
             <p:nvSpPr>
               <p:cNvPr id="3" name="Marcador de contenido 2">
@@ -10934,11 +10934,11 @@
                     <m:sSubSup>
                       <m:sSubSupPr>
                         <m:ctrlPr>
-                          <a:rPr lang="es-ES">
+                          <a:rPr lang="es-ES" i="1">
                             <a:solidFill>
                               <a:schemeClr val="bg1"/>
                             </a:solidFill>
-                            <a:latin typeface="Calibri" panose="020F0502020204030204" pitchFamily="34" charset="0"/>
+                            <a:latin typeface="Cambria Math" panose="02040503050406030204" pitchFamily="18" charset="0"/>
                             <a:cs typeface="Calibri" panose="020F0502020204030204" pitchFamily="34" charset="0"/>
                           </a:rPr>
                         </m:ctrlPr>
@@ -10949,7 +10949,7 @@
                             <a:solidFill>
                               <a:schemeClr val="bg1"/>
                             </a:solidFill>
-                            <a:latin typeface="Calibri" panose="020F0502020204030204" pitchFamily="34" charset="0"/>
+                            <a:latin typeface="Cambria Math" panose="02040503050406030204" pitchFamily="18" charset="0"/>
                             <a:cs typeface="Calibri" panose="020F0502020204030204" pitchFamily="34" charset="0"/>
                           </a:rPr>
                           <m:t>h</m:t>
@@ -10961,7 +10961,7 @@
                             <a:solidFill>
                               <a:schemeClr val="bg1"/>
                             </a:solidFill>
-                            <a:latin typeface="Calibri" panose="020F0502020204030204" pitchFamily="34" charset="0"/>
+                            <a:latin typeface="Cambria Math" panose="02040503050406030204" pitchFamily="18" charset="0"/>
                             <a:cs typeface="Calibri" panose="020F0502020204030204" pitchFamily="34" charset="0"/>
                           </a:rPr>
                           <m:t>𝑖</m:t>
@@ -10973,7 +10973,7 @@
                             <a:solidFill>
                               <a:schemeClr val="bg1"/>
                             </a:solidFill>
-                            <a:latin typeface="Calibri" panose="020F0502020204030204" pitchFamily="34" charset="0"/>
+                            <a:latin typeface="Cambria Math" panose="02040503050406030204" pitchFamily="18" charset="0"/>
                             <a:cs typeface="Calibri" panose="020F0502020204030204" pitchFamily="34" charset="0"/>
                           </a:rPr>
                           <m:t>2</m:t>
@@ -10999,7 +10999,7 @@
                         <a:solidFill>
                           <a:schemeClr val="bg1"/>
                         </a:solidFill>
-                        <a:latin typeface="Calibri" panose="020F0502020204030204" pitchFamily="34" charset="0"/>
+                        <a:latin typeface="Cambria Math" panose="02040503050406030204" pitchFamily="18" charset="0"/>
                         <a:cs typeface="Calibri" panose="020F0502020204030204" pitchFamily="34" charset="0"/>
                       </a:rPr>
                       <m:t>𝑖</m:t>
@@ -11009,7 +11009,7 @@
                         <a:solidFill>
                           <a:schemeClr val="bg1"/>
                         </a:solidFill>
-                        <a:latin typeface="Calibri" panose="020F0502020204030204" pitchFamily="34" charset="0"/>
+                        <a:latin typeface="Cambria Math" panose="02040503050406030204" pitchFamily="18" charset="0"/>
                         <a:cs typeface="Calibri" panose="020F0502020204030204" pitchFamily="34" charset="0"/>
                       </a:rPr>
                       <m:t>−</m:t>
@@ -11060,11 +11060,11 @@
                     <m:sSubSup>
                       <m:sSubSupPr>
                         <m:ctrlPr>
-                          <a:rPr lang="es-ES" dirty="0">
+                          <a:rPr lang="es-ES" i="1" dirty="0">
                             <a:solidFill>
                               <a:schemeClr val="bg1"/>
                             </a:solidFill>
-                            <a:latin typeface="Calibri" panose="020F0502020204030204" pitchFamily="34" charset="0"/>
+                            <a:latin typeface="Cambria Math" panose="02040503050406030204" pitchFamily="18" charset="0"/>
                             <a:cs typeface="Calibri" panose="020F0502020204030204" pitchFamily="34" charset="0"/>
                           </a:rPr>
                         </m:ctrlPr>
@@ -11075,7 +11075,7 @@
                             <a:solidFill>
                               <a:schemeClr val="bg1"/>
                             </a:solidFill>
-                            <a:latin typeface="Calibri" panose="020F0502020204030204" pitchFamily="34" charset="0"/>
+                            <a:latin typeface="Cambria Math" panose="02040503050406030204" pitchFamily="18" charset="0"/>
                             <a:cs typeface="Calibri" panose="020F0502020204030204" pitchFamily="34" charset="0"/>
                           </a:rPr>
                           <m:t>𝜓</m:t>
@@ -11087,7 +11087,7 @@
                             <a:solidFill>
                               <a:schemeClr val="bg1"/>
                             </a:solidFill>
-                            <a:latin typeface="Calibri" panose="020F0502020204030204" pitchFamily="34" charset="0"/>
+                            <a:latin typeface="Cambria Math" panose="02040503050406030204" pitchFamily="18" charset="0"/>
                             <a:cs typeface="Calibri" panose="020F0502020204030204" pitchFamily="34" charset="0"/>
                           </a:rPr>
                           <m:t>𝑖</m:t>
@@ -11099,7 +11099,7 @@
                             <a:solidFill>
                               <a:schemeClr val="bg1"/>
                             </a:solidFill>
-                            <a:latin typeface="Calibri" panose="020F0502020204030204" pitchFamily="34" charset="0"/>
+                            <a:latin typeface="Cambria Math" panose="02040503050406030204" pitchFamily="18" charset="0"/>
                             <a:cs typeface="Calibri" panose="020F0502020204030204" pitchFamily="34" charset="0"/>
                           </a:rPr>
                           <m:t>2</m:t>
@@ -11125,7 +11125,7 @@
                         <a:solidFill>
                           <a:schemeClr val="bg1"/>
                         </a:solidFill>
-                        <a:latin typeface="Calibri" panose="020F0502020204030204" pitchFamily="34" charset="0"/>
+                        <a:latin typeface="Cambria Math" panose="02040503050406030204" pitchFamily="18" charset="0"/>
                         <a:cs typeface="Calibri" panose="020F0502020204030204" pitchFamily="34" charset="0"/>
                       </a:rPr>
                       <m:t>𝑖</m:t>
@@ -11135,7 +11135,7 @@
                         <a:solidFill>
                           <a:schemeClr val="bg1"/>
                         </a:solidFill>
-                        <a:latin typeface="Calibri" panose="020F0502020204030204" pitchFamily="34" charset="0"/>
+                        <a:latin typeface="Cambria Math" panose="02040503050406030204" pitchFamily="18" charset="0"/>
                         <a:cs typeface="Calibri" panose="020F0502020204030204" pitchFamily="34" charset="0"/>
                       </a:rPr>
                       <m:t>−</m:t>
@@ -11183,7 +11183,7 @@
                         <a:solidFill>
                           <a:srgbClr val="92D050"/>
                         </a:solidFill>
-                        <a:latin typeface="Calibri" panose="020F0502020204030204" pitchFamily="34" charset="0"/>
+                        <a:latin typeface="Cambria Math" panose="02040503050406030204" pitchFamily="18" charset="0"/>
                         <a:cs typeface="Calibri" panose="020F0502020204030204" pitchFamily="34" charset="0"/>
                       </a:rPr>
                       <m:t>"</m:t>
@@ -11193,7 +11193,7 @@
                         <a:solidFill>
                           <a:srgbClr val="92D050"/>
                         </a:solidFill>
-                        <a:latin typeface="Calibri" panose="020F0502020204030204" pitchFamily="34" charset="0"/>
+                        <a:latin typeface="Cambria Math" panose="02040503050406030204" pitchFamily="18" charset="0"/>
                         <a:cs typeface="Calibri" panose="020F0502020204030204" pitchFamily="34" charset="0"/>
                       </a:rPr>
                       <m:t>𝑢𝑛𝑖𝑐𝑖𝑑𝑎𝑑𝑒𝑠</m:t>
@@ -11203,7 +11203,7 @@
                         <a:solidFill>
                           <a:srgbClr val="92D050"/>
                         </a:solidFill>
-                        <a:latin typeface="Calibri" panose="020F0502020204030204" pitchFamily="34" charset="0"/>
+                        <a:latin typeface="Cambria Math" panose="02040503050406030204" pitchFamily="18" charset="0"/>
                         <a:cs typeface="Calibri" panose="020F0502020204030204" pitchFamily="34" charset="0"/>
                       </a:rPr>
                       <m:t>“</m:t>
@@ -11231,7 +11231,7 @@
             </p:txBody>
           </p:sp>
         </mc:Choice>
-        <mc:Fallback>
+        <mc:Fallback xmlns="">
           <p:sp>
             <p:nvSpPr>
               <p:cNvPr id="3" name="Marcador de contenido 2">
@@ -11344,8 +11344,8 @@
           </a:p>
         </p:txBody>
       </p:sp>
-      <mc:AlternateContent xmlns:mc="http://schemas.openxmlformats.org/markup-compatibility/2006">
-        <mc:Choice xmlns:a14="http://schemas.microsoft.com/office/drawing/2010/main" Requires="a14">
+      <mc:AlternateContent xmlns:mc="http://schemas.openxmlformats.org/markup-compatibility/2006" xmlns:a14="http://schemas.microsoft.com/office/drawing/2010/main">
+        <mc:Choice Requires="a14">
           <p:sp>
             <p:nvSpPr>
               <p:cNvPr id="3" name="Marcador de contenido 2">
@@ -11866,7 +11866,7 @@
             </p:txBody>
           </p:sp>
         </mc:Choice>
-        <mc:Fallback>
+        <mc:Fallback xmlns="">
           <p:sp>
             <p:nvSpPr>
               <p:cNvPr id="3" name="Marcador de contenido 2">
@@ -11979,8 +11979,8 @@
           </a:p>
         </p:txBody>
       </p:sp>
-      <mc:AlternateContent xmlns:mc="http://schemas.openxmlformats.org/markup-compatibility/2006">
-        <mc:Choice xmlns:a14="http://schemas.microsoft.com/office/drawing/2010/main" Requires="a14">
+      <mc:AlternateContent xmlns:mc="http://schemas.openxmlformats.org/markup-compatibility/2006" xmlns:a14="http://schemas.microsoft.com/office/drawing/2010/main">
+        <mc:Choice Requires="a14">
           <p:sp>
             <p:nvSpPr>
               <p:cNvPr id="3" name="Marcador de contenido 2">
@@ -12096,7 +12096,7 @@
                     <m:d>
                       <m:dPr>
                         <m:ctrlPr>
-                          <a:rPr lang="es-ES" b="0" i="0" dirty="0" smtClean="0">
+                          <a:rPr lang="es-ES" b="0" i="1" dirty="0" smtClean="0">
                             <a:solidFill>
                               <a:schemeClr val="bg1"/>
                             </a:solidFill>
@@ -12171,7 +12171,7 @@
                         <m:sSup>
                           <m:sSupPr>
                             <m:ctrlPr>
-                              <a:rPr lang="es-ES" b="0" i="0" dirty="0" smtClean="0">
+                              <a:rPr lang="es-ES" b="0" i="1" dirty="0" smtClean="0">
                                 <a:solidFill>
                                   <a:schemeClr val="bg1"/>
                                 </a:solidFill>
@@ -12221,7 +12221,7 @@
                         <m:sSup>
                           <m:sSupPr>
                             <m:ctrlPr>
-                              <a:rPr lang="es-ES" b="1" i="0" dirty="0" smtClean="0">
+                              <a:rPr lang="es-ES" b="1" i="1" dirty="0" smtClean="0">
                                 <a:solidFill>
                                   <a:schemeClr val="bg1"/>
                                 </a:solidFill>
@@ -12482,7 +12482,7 @@
             </p:txBody>
           </p:sp>
         </mc:Choice>
-        <mc:Fallback>
+        <mc:Fallback xmlns="">
           <p:sp>
             <p:nvSpPr>
               <p:cNvPr id="3" name="Marcador de contenido 2">
@@ -12595,8 +12595,8 @@
           </a:p>
         </p:txBody>
       </p:sp>
-      <mc:AlternateContent xmlns:mc="http://schemas.openxmlformats.org/markup-compatibility/2006">
-        <mc:Choice xmlns:a14="http://schemas.microsoft.com/office/drawing/2010/main" Requires="a14">
+      <mc:AlternateContent xmlns:mc="http://schemas.openxmlformats.org/markup-compatibility/2006" xmlns:a14="http://schemas.microsoft.com/office/drawing/2010/main">
+        <mc:Choice Requires="a14">
           <p:sp>
             <p:nvSpPr>
               <p:cNvPr id="3" name="Marcador de contenido 2">
@@ -12741,7 +12741,7 @@
                       <m:sSup>
                         <m:sSupPr>
                           <m:ctrlPr>
-                            <a:rPr lang="es-ES" b="0" i="0" dirty="0" smtClean="0">
+                            <a:rPr lang="es-ES" b="0" i="1" dirty="0" smtClean="0">
                               <a:solidFill>
                                 <a:schemeClr val="bg1"/>
                               </a:solidFill>
@@ -13096,7 +13096,7 @@
                       <m:sSup>
                         <m:sSupPr>
                           <m:ctrlPr>
-                            <a:rPr lang="es-ES" b="1" i="0" dirty="0" smtClean="0">
+                            <a:rPr lang="es-ES" b="1" i="1" dirty="0" smtClean="0">
                               <a:solidFill>
                                 <a:schemeClr val="bg1"/>
                               </a:solidFill>
@@ -13136,7 +13136,7 @@
                       <m:sSup>
                         <m:sSupPr>
                           <m:ctrlPr>
-                            <a:rPr lang="es-ES" b="1" i="0" dirty="0" smtClean="0">
+                            <a:rPr lang="es-ES" b="1" i="1" dirty="0" smtClean="0">
                               <a:solidFill>
                                 <a:schemeClr val="bg1"/>
                               </a:solidFill>
@@ -13471,7 +13471,7 @@
             </p:txBody>
           </p:sp>
         </mc:Choice>
-        <mc:Fallback>
+        <mc:Fallback xmlns="">
           <p:sp>
             <p:nvSpPr>
               <p:cNvPr id="3" name="Marcador de contenido 2">
@@ -13584,8 +13584,8 @@
           </a:p>
         </p:txBody>
       </p:sp>
-      <mc:AlternateContent xmlns:mc="http://schemas.openxmlformats.org/markup-compatibility/2006">
-        <mc:Choice xmlns:a14="http://schemas.microsoft.com/office/drawing/2010/main" Requires="a14">
+      <mc:AlternateContent xmlns:mc="http://schemas.openxmlformats.org/markup-compatibility/2006" xmlns:a14="http://schemas.microsoft.com/office/drawing/2010/main">
+        <mc:Choice Requires="a14">
           <p:sp>
             <p:nvSpPr>
               <p:cNvPr id="3" name="Marcador de contenido 2">
@@ -13949,7 +13949,7 @@
                     <m:sSup>
                       <m:sSupPr>
                         <m:ctrlPr>
-                          <a:rPr lang="es-ES" b="0" i="0" dirty="0" smtClean="0">
+                          <a:rPr lang="es-ES" b="0" i="1" dirty="0" smtClean="0">
                             <a:solidFill>
                               <a:schemeClr val="bg1"/>
                             </a:solidFill>
@@ -14562,7 +14562,7 @@
             </p:txBody>
           </p:sp>
         </mc:Choice>
-        <mc:Fallback>
+        <mc:Fallback xmlns="">
           <p:sp>
             <p:nvSpPr>
               <p:cNvPr id="3" name="Marcador de contenido 2">
@@ -14675,8 +14675,8 @@
           </a:p>
         </p:txBody>
       </p:sp>
-      <mc:AlternateContent xmlns:mc="http://schemas.openxmlformats.org/markup-compatibility/2006">
-        <mc:Choice xmlns:a14="http://schemas.microsoft.com/office/drawing/2010/main" Requires="a14">
+      <mc:AlternateContent xmlns:mc="http://schemas.openxmlformats.org/markup-compatibility/2006" xmlns:a14="http://schemas.microsoft.com/office/drawing/2010/main">
+        <mc:Choice Requires="a14">
           <p:sp>
             <p:nvSpPr>
               <p:cNvPr id="3" name="Marcador de contenido 2">
@@ -15280,7 +15280,7 @@
             </p:txBody>
           </p:sp>
         </mc:Choice>
-        <mc:Fallback>
+        <mc:Fallback xmlns="">
           <p:sp>
             <p:nvSpPr>
               <p:cNvPr id="3" name="Marcador de contenido 2">
@@ -15393,8 +15393,8 @@
           </a:p>
         </p:txBody>
       </p:sp>
-      <mc:AlternateContent xmlns:mc="http://schemas.openxmlformats.org/markup-compatibility/2006">
-        <mc:Choice xmlns:a14="http://schemas.microsoft.com/office/drawing/2010/main" Requires="a14">
+      <mc:AlternateContent xmlns:mc="http://schemas.openxmlformats.org/markup-compatibility/2006" xmlns:a14="http://schemas.microsoft.com/office/drawing/2010/main">
+        <mc:Choice Requires="a14">
           <p:sp>
             <p:nvSpPr>
               <p:cNvPr id="3" name="Marcador de contenido 2">
@@ -15458,7 +15458,7 @@
                         <m:begChr m:val="["/>
                         <m:endChr m:val="]"/>
                         <m:ctrlPr>
-                          <a:rPr lang="es-ES" b="1" i="0" dirty="0" smtClean="0">
+                          <a:rPr lang="es-ES" b="1" i="1" dirty="0" smtClean="0">
                             <a:solidFill>
                               <a:schemeClr val="bg1"/>
                             </a:solidFill>
@@ -15470,7 +15470,7 @@
                         <m:sSub>
                           <m:sSubPr>
                             <m:ctrlPr>
-                              <a:rPr lang="es-ES" b="1" i="0" dirty="0" smtClean="0">
+                              <a:rPr lang="es-ES" b="1" i="1" dirty="0" smtClean="0">
                                 <a:solidFill>
                                   <a:schemeClr val="bg1"/>
                                 </a:solidFill>
@@ -15513,7 +15513,7 @@
                         <m:sSub>
                           <m:sSubPr>
                             <m:ctrlPr>
-                              <a:rPr lang="es-ES" b="1" i="0" dirty="0" smtClean="0">
+                              <a:rPr lang="es-ES" b="1" i="1" dirty="0" smtClean="0">
                                 <a:solidFill>
                                   <a:schemeClr val="bg1"/>
                                 </a:solidFill>
@@ -15556,7 +15556,7 @@
                         <m:sSub>
                           <m:sSubPr>
                             <m:ctrlPr>
-                              <a:rPr lang="es-ES" b="0" i="0" dirty="0" smtClean="0">
+                              <a:rPr lang="es-ES" b="0" i="1" dirty="0" smtClean="0">
                                 <a:solidFill>
                                   <a:schemeClr val="bg1"/>
                                 </a:solidFill>
@@ -16012,7 +16012,7 @@
                                 </m:mc>
                               </m:mcs>
                               <m:ctrlPr>
-                                <a:rPr lang="es-ES" b="1" smtClean="0">
+                                <a:rPr lang="es-ES" b="1" i="1" smtClean="0">
                                   <a:solidFill>
                                     <a:schemeClr val="bg1"/>
                                   </a:solidFill>
@@ -16025,7 +16025,7 @@
                                 <m:sSub>
                                   <m:sSubPr>
                                     <m:ctrlPr>
-                                      <a:rPr lang="es-ES" b="1" smtClean="0">
+                                      <a:rPr lang="es-ES" b="1" i="1" smtClean="0">
                                         <a:solidFill>
                                           <a:schemeClr val="bg1"/>
                                         </a:solidFill>
@@ -16069,7 +16069,7 @@
                                 <m:sSub>
                                   <m:sSubPr>
                                     <m:ctrlPr>
-                                      <a:rPr lang="es-ES" b="1" smtClean="0">
+                                      <a:rPr lang="es-ES" b="1" i="1" smtClean="0">
                                         <a:solidFill>
                                           <a:schemeClr val="bg1"/>
                                         </a:solidFill>
@@ -16650,7 +16650,7 @@
             </p:txBody>
           </p:sp>
         </mc:Choice>
-        <mc:Fallback>
+        <mc:Fallback xmlns="">
           <p:sp>
             <p:nvSpPr>
               <p:cNvPr id="3" name="Marcador de contenido 2">
@@ -16763,8 +16763,8 @@
           </a:p>
         </p:txBody>
       </p:sp>
-      <mc:AlternateContent xmlns:mc="http://schemas.openxmlformats.org/markup-compatibility/2006">
-        <mc:Choice xmlns:a14="http://schemas.microsoft.com/office/drawing/2010/main" Requires="a14">
+      <mc:AlternateContent xmlns:mc="http://schemas.openxmlformats.org/markup-compatibility/2006" xmlns:a14="http://schemas.microsoft.com/office/drawing/2010/main">
+        <mc:Choice Requires="a14">
           <p:sp>
             <p:nvSpPr>
               <p:cNvPr id="3" name="Marcador de contenido 2">
@@ -18335,7 +18335,7 @@
             </p:txBody>
           </p:sp>
         </mc:Choice>
-        <mc:Fallback>
+        <mc:Fallback xmlns="">
           <p:sp>
             <p:nvSpPr>
               <p:cNvPr id="3" name="Marcador de contenido 2">
@@ -18448,8 +18448,8 @@
           </a:p>
         </p:txBody>
       </p:sp>
-      <mc:AlternateContent xmlns:mc="http://schemas.openxmlformats.org/markup-compatibility/2006">
-        <mc:Choice xmlns:a14="http://schemas.microsoft.com/office/drawing/2010/main" Requires="a14">
+      <mc:AlternateContent xmlns:mc="http://schemas.openxmlformats.org/markup-compatibility/2006" xmlns:a14="http://schemas.microsoft.com/office/drawing/2010/main">
+        <mc:Choice Requires="a14">
           <p:sp>
             <p:nvSpPr>
               <p:cNvPr id="3" name="Marcador de contenido 2">
@@ -19734,7 +19734,7 @@
             </p:txBody>
           </p:sp>
         </mc:Choice>
-        <mc:Fallback>
+        <mc:Fallback xmlns="">
           <p:sp>
             <p:nvSpPr>
               <p:cNvPr id="3" name="Marcador de contenido 2">
@@ -19847,8 +19847,8 @@
           </a:p>
         </p:txBody>
       </p:sp>
-      <mc:AlternateContent xmlns:mc="http://schemas.openxmlformats.org/markup-compatibility/2006">
-        <mc:Choice xmlns:a14="http://schemas.microsoft.com/office/drawing/2010/main" Requires="a14">
+      <mc:AlternateContent xmlns:mc="http://schemas.openxmlformats.org/markup-compatibility/2006" xmlns:a14="http://schemas.microsoft.com/office/drawing/2010/main">
+        <mc:Choice Requires="a14">
           <p:sp>
             <p:nvSpPr>
               <p:cNvPr id="3" name="Marcador de contenido 2">
@@ -20450,7 +20450,7 @@
                     <m:d>
                       <m:dPr>
                         <m:ctrlPr>
-                          <a:rPr lang="es-ES" sz="2000" b="0" i="0" smtClean="0">
+                          <a:rPr lang="es-ES" sz="2000" b="0" i="1" smtClean="0">
                             <a:solidFill>
                               <a:schemeClr val="bg1"/>
                             </a:solidFill>
@@ -20623,7 +20623,7 @@
             </p:txBody>
           </p:sp>
         </mc:Choice>
-        <mc:Fallback>
+        <mc:Fallback xmlns="">
           <p:sp>
             <p:nvSpPr>
               <p:cNvPr id="3" name="Marcador de contenido 2">
@@ -20736,8 +20736,8 @@
           </a:p>
         </p:txBody>
       </p:sp>
-      <mc:AlternateContent xmlns:mc="http://schemas.openxmlformats.org/markup-compatibility/2006">
-        <mc:Choice xmlns:a14="http://schemas.microsoft.com/office/drawing/2010/main" Requires="a14">
+      <mc:AlternateContent xmlns:mc="http://schemas.openxmlformats.org/markup-compatibility/2006" xmlns:a14="http://schemas.microsoft.com/office/drawing/2010/main">
+        <mc:Choice Requires="a14">
           <p:sp>
             <p:nvSpPr>
               <p:cNvPr id="3" name="Marcador de contenido 2">
@@ -21270,7 +21270,7 @@
                         <m:begChr m:val="["/>
                         <m:endChr m:val="]"/>
                         <m:ctrlPr>
-                          <a:rPr lang="es-ES" sz="2000" b="0" i="0" dirty="0" smtClean="0">
+                          <a:rPr lang="es-ES" sz="2000" b="0" i="1" dirty="0" smtClean="0">
                             <a:solidFill>
                               <a:schemeClr val="bg1"/>
                             </a:solidFill>
@@ -21342,7 +21342,7 @@
             </p:txBody>
           </p:sp>
         </mc:Choice>
-        <mc:Fallback>
+        <mc:Fallback xmlns="">
           <p:sp>
             <p:nvSpPr>
               <p:cNvPr id="3" name="Marcador de contenido 2">
@@ -21455,8 +21455,8 @@
           </a:p>
         </p:txBody>
       </p:sp>
-      <mc:AlternateContent xmlns:mc="http://schemas.openxmlformats.org/markup-compatibility/2006">
-        <mc:Choice xmlns:a14="http://schemas.microsoft.com/office/drawing/2010/main" Requires="a14">
+      <mc:AlternateContent xmlns:mc="http://schemas.openxmlformats.org/markup-compatibility/2006" xmlns:a14="http://schemas.microsoft.com/office/drawing/2010/main">
+        <mc:Choice Requires="a14">
           <p:sp>
             <p:nvSpPr>
               <p:cNvPr id="3" name="Marcador de contenido 2">
@@ -22305,7 +22305,7 @@
             </p:txBody>
           </p:sp>
         </mc:Choice>
-        <mc:Fallback>
+        <mc:Fallback xmlns="">
           <p:sp>
             <p:nvSpPr>
               <p:cNvPr id="3" name="Marcador de contenido 2">
@@ -22418,8 +22418,8 @@
           </a:p>
         </p:txBody>
       </p:sp>
-      <mc:AlternateContent xmlns:mc="http://schemas.openxmlformats.org/markup-compatibility/2006">
-        <mc:Choice xmlns:a14="http://schemas.microsoft.com/office/drawing/2010/main" Requires="a14">
+      <mc:AlternateContent xmlns:mc="http://schemas.openxmlformats.org/markup-compatibility/2006" xmlns:a14="http://schemas.microsoft.com/office/drawing/2010/main">
+        <mc:Choice Requires="a14">
           <p:sp>
             <p:nvSpPr>
               <p:cNvPr id="3" name="Marcador de contenido 2">
@@ -22479,6 +22479,7 @@
                         <a:solidFill>
                           <a:schemeClr val="bg1"/>
                         </a:solidFill>
+                        <a:latin typeface="Cambria Math" panose="02040503050406030204" pitchFamily="18" charset="0"/>
                       </a:rPr>
                       <m:t>𝑗</m:t>
                     </m:r>
@@ -22497,10 +22498,11 @@
                     <m:sSub>
                       <m:sSubPr>
                         <m:ctrlPr>
-                          <a:rPr lang="es-ES">
+                          <a:rPr lang="es-ES" i="1">
                             <a:solidFill>
                               <a:schemeClr val="bg1"/>
                             </a:solidFill>
+                            <a:latin typeface="Cambria Math" panose="02040503050406030204" pitchFamily="18" charset="0"/>
                           </a:rPr>
                         </m:ctrlPr>
                       </m:sSubPr>
@@ -22510,6 +22512,7 @@
                             <a:solidFill>
                               <a:schemeClr val="bg1"/>
                             </a:solidFill>
+                            <a:latin typeface="Cambria Math" panose="02040503050406030204" pitchFamily="18" charset="0"/>
                           </a:rPr>
                           <m:t>𝜇</m:t>
                         </m:r>
@@ -22520,6 +22523,7 @@
                             <a:solidFill>
                               <a:schemeClr val="bg1"/>
                             </a:solidFill>
+                            <a:latin typeface="Cambria Math" panose="02040503050406030204" pitchFamily="18" charset="0"/>
                           </a:rPr>
                           <m:t>𝑗</m:t>
                         </m:r>
@@ -23617,7 +23621,7 @@
             </p:txBody>
           </p:sp>
         </mc:Choice>
-        <mc:Fallback>
+        <mc:Fallback xmlns="">
           <p:sp>
             <p:nvSpPr>
               <p:cNvPr id="3" name="Marcador de contenido 2">
@@ -23756,7 +23760,7 @@
             </p:spPr>
             <p:txBody>
               <a:bodyPr>
-                <a:normAutofit/>
+                <a:normAutofit lnSpcReduction="10000"/>
               </a:bodyPr>
               <a:lstStyle/>
               <a:p>
@@ -24006,6 +24010,18 @@
                 <a:pPr marL="0" indent="0">
                   <a:buNone/>
                 </a:pPr>
+                <a:endParaRPr lang="es-ES" sz="300" dirty="0">
+                  <a:solidFill>
+                    <a:schemeClr val="bg1"/>
+                  </a:solidFill>
+                  <a:latin typeface="Calibri" panose="020F0502020204030204" pitchFamily="34" charset="0"/>
+                  <a:cs typeface="Calibri" panose="020F0502020204030204" pitchFamily="34" charset="0"/>
+                </a:endParaRPr>
+              </a:p>
+              <a:p>
+                <a:pPr marL="0" indent="0">
+                  <a:buNone/>
+                </a:pPr>
                 <a14:m>
                   <m:oMathPara xmlns:m="http://schemas.openxmlformats.org/officeDocument/2006/math">
                     <m:oMathParaPr>
@@ -24103,6 +24119,18 @@
                 <a:pPr marL="0" indent="0">
                   <a:buNone/>
                 </a:pPr>
+                <a:endParaRPr lang="es-ES" sz="300" dirty="0">
+                  <a:solidFill>
+                    <a:schemeClr val="bg1"/>
+                  </a:solidFill>
+                  <a:latin typeface="Calibri" panose="020F0502020204030204" pitchFamily="34" charset="0"/>
+                  <a:cs typeface="Calibri" panose="020F0502020204030204" pitchFamily="34" charset="0"/>
+                </a:endParaRPr>
+              </a:p>
+              <a:p>
+                <a:pPr marL="0" indent="0">
+                  <a:buNone/>
+                </a:pPr>
                 <a14:m>
                   <m:oMathPara xmlns:m="http://schemas.openxmlformats.org/officeDocument/2006/math">
                     <m:oMathParaPr>
@@ -24112,7 +24140,7 @@
                       <m:d>
                         <m:dPr>
                           <m:ctrlPr>
-                            <a:rPr lang="es-ES" b="1" i="0" dirty="0" smtClean="0">
+                            <a:rPr lang="es-ES" b="1" i="1" dirty="0" smtClean="0">
                               <a:solidFill>
                                 <a:schemeClr val="bg1"/>
                               </a:solidFill>
@@ -24316,6 +24344,18 @@
                 <a:pPr marL="0" indent="0">
                   <a:buNone/>
                 </a:pPr>
+                <a:endParaRPr lang="es-ES" sz="300" dirty="0">
+                  <a:solidFill>
+                    <a:schemeClr val="bg1"/>
+                  </a:solidFill>
+                  <a:latin typeface="Calibri" panose="020F0502020204030204" pitchFamily="34" charset="0"/>
+                  <a:cs typeface="Calibri" panose="020F0502020204030204" pitchFamily="34" charset="0"/>
+                </a:endParaRPr>
+              </a:p>
+              <a:p>
+                <a:pPr marL="0" indent="0">
+                  <a:buNone/>
+                </a:pPr>
                 <a14:m>
                   <m:oMathPara xmlns:m="http://schemas.openxmlformats.org/officeDocument/2006/math">
                     <m:oMathParaPr>
@@ -24462,7 +24502,7 @@
                           <m:begChr m:val="["/>
                           <m:endChr m:val="]"/>
                           <m:ctrlPr>
-                            <a:rPr lang="es-ES" b="0" i="0" dirty="0" smtClean="0">
+                            <a:rPr lang="es-ES" b="0" i="1" dirty="0" smtClean="0">
                               <a:solidFill>
                                 <a:schemeClr val="bg1"/>
                               </a:solidFill>
@@ -24655,6 +24695,7 @@
                         <a:solidFill>
                           <a:schemeClr val="bg1"/>
                         </a:solidFill>
+                        <a:latin typeface="Cambria Math" panose="02040503050406030204" pitchFamily="18" charset="0"/>
                       </a:rPr>
                       <m:t> </m:t>
                     </m:r>
@@ -24666,6 +24707,7 @@
                         <a:solidFill>
                           <a:schemeClr val="bg1"/>
                         </a:solidFill>
+                        <a:latin typeface="Cambria Math" panose="02040503050406030204" pitchFamily="18" charset="0"/>
                       </a:rPr>
                       <m:t>E</m:t>
                     </m:r>
@@ -24674,10 +24716,11 @@
                         <m:begChr m:val="["/>
                         <m:endChr m:val="]"/>
                         <m:ctrlPr>
-                          <a:rPr lang="es-ES" dirty="0">
+                          <a:rPr lang="es-ES" i="1" dirty="0">
                             <a:solidFill>
                               <a:schemeClr val="bg1"/>
                             </a:solidFill>
+                            <a:latin typeface="Cambria Math" panose="02040503050406030204" pitchFamily="18" charset="0"/>
                           </a:rPr>
                         </m:ctrlPr>
                       </m:dPr>
@@ -24687,16 +24730,18 @@
                             <a:solidFill>
                               <a:schemeClr val="bg1"/>
                             </a:solidFill>
+                            <a:latin typeface="Cambria Math" panose="02040503050406030204" pitchFamily="18" charset="0"/>
                           </a:rPr>
                           <m:t>𝐟</m:t>
                         </m:r>
                         <m:sSup>
                           <m:sSupPr>
                             <m:ctrlPr>
-                              <a:rPr lang="es-ES">
+                              <a:rPr lang="es-ES" i="1">
                                 <a:solidFill>
                                   <a:schemeClr val="bg1"/>
                                 </a:solidFill>
+                                <a:latin typeface="Cambria Math" panose="02040503050406030204" pitchFamily="18" charset="0"/>
                               </a:rPr>
                             </m:ctrlPr>
                           </m:sSupPr>
@@ -24706,6 +24751,7 @@
                                 <a:solidFill>
                                   <a:schemeClr val="bg1"/>
                                 </a:solidFill>
+                                <a:latin typeface="Cambria Math" panose="02040503050406030204" pitchFamily="18" charset="0"/>
                               </a:rPr>
                               <m:t>𝐟</m:t>
                             </m:r>
@@ -24716,6 +24762,7 @@
                                 <a:solidFill>
                                   <a:schemeClr val="bg1"/>
                                 </a:solidFill>
+                                <a:latin typeface="Cambria Math" panose="02040503050406030204" pitchFamily="18" charset="0"/>
                               </a:rPr>
                               <m:t>𝑡</m:t>
                             </m:r>
@@ -24728,6 +24775,7 @@
                         <a:solidFill>
                           <a:schemeClr val="bg1"/>
                         </a:solidFill>
+                        <a:latin typeface="Cambria Math" panose="02040503050406030204" pitchFamily="18" charset="0"/>
                       </a:rPr>
                       <m:t>=</m:t>
                     </m:r>
@@ -24736,6 +24784,7 @@
                         <a:solidFill>
                           <a:schemeClr val="bg1"/>
                         </a:solidFill>
+                        <a:latin typeface="Cambria Math" panose="02040503050406030204" pitchFamily="18" charset="0"/>
                       </a:rPr>
                       <m:t>𝐼</m:t>
                     </m:r>
@@ -24765,7 +24814,7 @@
                         <m:begChr m:val="["/>
                         <m:endChr m:val="]"/>
                         <m:ctrlPr>
-                          <a:rPr lang="es-ES" b="1" i="0" dirty="0" smtClean="0">
+                          <a:rPr lang="es-ES" b="1" i="1" dirty="0" smtClean="0">
                             <a:solidFill>
                               <a:schemeClr val="bg1"/>
                             </a:solidFill>
@@ -24817,6 +24866,7 @@
                         <a:solidFill>
                           <a:schemeClr val="bg1"/>
                         </a:solidFill>
+                        <a:latin typeface="Cambria Math" panose="02040503050406030204" pitchFamily="18" charset="0"/>
                       </a:rPr>
                       <m:t>𝑬</m:t>
                     </m:r>
@@ -24825,10 +24875,11 @@
                         <m:begChr m:val="["/>
                         <m:endChr m:val="]"/>
                         <m:ctrlPr>
-                          <a:rPr lang="es-ES" dirty="0">
+                          <a:rPr lang="es-ES" i="1" dirty="0">
                             <a:solidFill>
                               <a:schemeClr val="bg1"/>
                             </a:solidFill>
+                            <a:latin typeface="Cambria Math" panose="02040503050406030204" pitchFamily="18" charset="0"/>
                           </a:rPr>
                         </m:ctrlPr>
                       </m:dPr>
@@ -24838,16 +24889,18 @@
                             <a:solidFill>
                               <a:schemeClr val="bg1"/>
                             </a:solidFill>
+                            <a:latin typeface="Cambria Math" panose="02040503050406030204" pitchFamily="18" charset="0"/>
                           </a:rPr>
                           <m:t>𝐮</m:t>
                         </m:r>
                         <m:sSup>
                           <m:sSupPr>
                             <m:ctrlPr>
-                              <a:rPr lang="es-ES">
+                              <a:rPr lang="es-ES" i="1">
                                 <a:solidFill>
                                   <a:schemeClr val="bg1"/>
                                 </a:solidFill>
+                                <a:latin typeface="Cambria Math" panose="02040503050406030204" pitchFamily="18" charset="0"/>
                               </a:rPr>
                             </m:ctrlPr>
                           </m:sSupPr>
@@ -24857,6 +24910,7 @@
                                 <a:solidFill>
                                   <a:schemeClr val="bg1"/>
                                 </a:solidFill>
+                                <a:latin typeface="Cambria Math" panose="02040503050406030204" pitchFamily="18" charset="0"/>
                               </a:rPr>
                               <m:t>𝐟</m:t>
                             </m:r>
@@ -24867,6 +24921,7 @@
                                 <a:solidFill>
                                   <a:schemeClr val="bg1"/>
                                 </a:solidFill>
+                                <a:latin typeface="Cambria Math" panose="02040503050406030204" pitchFamily="18" charset="0"/>
                               </a:rPr>
                               <m:t>𝑡</m:t>
                             </m:r>
@@ -24879,6 +24934,7 @@
                         <a:solidFill>
                           <a:schemeClr val="bg1"/>
                         </a:solidFill>
+                        <a:latin typeface="Cambria Math" panose="02040503050406030204" pitchFamily="18" charset="0"/>
                       </a:rPr>
                       <m:t>=0</m:t>
                     </m:r>
@@ -24945,7 +25001,7 @@
               <a:blipFill>
                 <a:blip r:embed="rId2"/>
                 <a:stretch>
-                  <a:fillRect l="-136" t="-742" r="-1018"/>
+                  <a:fillRect l="-136" t="-1236" r="-1154"/>
                 </a:stretch>
               </a:blipFill>
             </p:spPr>
@@ -25033,8 +25089,8 @@
           </a:p>
         </p:txBody>
       </p:sp>
-      <mc:AlternateContent xmlns:mc="http://schemas.openxmlformats.org/markup-compatibility/2006">
-        <mc:Choice xmlns:a14="http://schemas.microsoft.com/office/drawing/2010/main" Requires="a14">
+      <mc:AlternateContent xmlns:mc="http://schemas.openxmlformats.org/markup-compatibility/2006" xmlns:a14="http://schemas.microsoft.com/office/drawing/2010/main">
+        <mc:Choice Requires="a14">
           <p:sp>
             <p:nvSpPr>
               <p:cNvPr id="3" name="Marcador de contenido 2">
@@ -25083,7 +25139,7 @@
                         <a:solidFill>
                           <a:schemeClr val="bg1"/>
                         </a:solidFill>
-                        <a:latin typeface="Calibri" panose="020F0502020204030204" pitchFamily="34" charset="0"/>
+                        <a:latin typeface="Cambria Math" panose="02040503050406030204" pitchFamily="18" charset="0"/>
                         <a:cs typeface="Calibri" panose="020F0502020204030204" pitchFamily="34" charset="0"/>
                       </a:rPr>
                       <m:t>Λ</m:t>
@@ -25556,7 +25612,7 @@
             </p:txBody>
           </p:sp>
         </mc:Choice>
-        <mc:Fallback>
+        <mc:Fallback xmlns="">
           <p:sp>
             <p:nvSpPr>
               <p:cNvPr id="3" name="Marcador de contenido 2">
@@ -25669,8 +25725,8 @@
           </a:p>
         </p:txBody>
       </p:sp>
-      <mc:AlternateContent xmlns:mc="http://schemas.openxmlformats.org/markup-compatibility/2006">
-        <mc:Choice xmlns:a14="http://schemas.microsoft.com/office/drawing/2010/main" Requires="a14">
+      <mc:AlternateContent xmlns:mc="http://schemas.openxmlformats.org/markup-compatibility/2006" xmlns:a14="http://schemas.microsoft.com/office/drawing/2010/main">
+        <mc:Choice Requires="a14">
           <p:sp>
             <p:nvSpPr>
               <p:cNvPr id="3" name="Marcador de contenido 2">
@@ -25925,7 +25981,7 @@
                           <m:begChr m:val="["/>
                           <m:endChr m:val="]"/>
                           <m:ctrlPr>
-                            <a:rPr lang="es-ES" b="0" i="0" dirty="0" smtClean="0">
+                            <a:rPr lang="es-ES" b="0" i="1" dirty="0" smtClean="0">
                               <a:solidFill>
                                 <a:schemeClr val="bg1"/>
                               </a:solidFill>
@@ -25938,7 +25994,7 @@
                           <m:sSup>
                             <m:sSupPr>
                               <m:ctrlPr>
-                                <a:rPr lang="es-ES" b="0" i="0" dirty="0" smtClean="0">
+                                <a:rPr lang="es-ES" b="0" i="1" dirty="0" smtClean="0">
                                   <a:solidFill>
                                     <a:schemeClr val="bg1"/>
                                   </a:solidFill>
@@ -25980,7 +26036,7 @@
                       <m:sSup>
                         <m:sSupPr>
                           <m:ctrlPr>
-                            <a:rPr lang="es-ES" b="0" i="0" dirty="0" smtClean="0">
+                            <a:rPr lang="es-ES" b="0" i="1" dirty="0" smtClean="0">
                               <a:solidFill>
                                 <a:schemeClr val="bg1"/>
                               </a:solidFill>
@@ -26292,7 +26348,7 @@
                       <m:sSup>
                         <m:sSupPr>
                           <m:ctrlPr>
-                            <a:rPr lang="es-ES" b="0" i="0" dirty="0" smtClean="0">
+                            <a:rPr lang="es-ES" b="0" i="1" dirty="0" smtClean="0">
                               <a:solidFill>
                                 <a:schemeClr val="bg1"/>
                               </a:solidFill>
@@ -26545,7 +26601,7 @@
             </p:txBody>
           </p:sp>
         </mc:Choice>
-        <mc:Fallback>
+        <mc:Fallback xmlns="">
           <p:sp>
             <p:nvSpPr>
               <p:cNvPr id="3" name="Marcador de contenido 2">
@@ -26658,8 +26714,8 @@
           </a:p>
         </p:txBody>
       </p:sp>
-      <mc:AlternateContent xmlns:mc="http://schemas.openxmlformats.org/markup-compatibility/2006">
-        <mc:Choice xmlns:a14="http://schemas.microsoft.com/office/drawing/2010/main" Requires="a14">
+      <mc:AlternateContent xmlns:mc="http://schemas.openxmlformats.org/markup-compatibility/2006" xmlns:a14="http://schemas.microsoft.com/office/drawing/2010/main">
+        <mc:Choice Requires="a14">
           <p:sp>
             <p:nvSpPr>
               <p:cNvPr id="3" name="Marcador de contenido 2">
@@ -26736,7 +26792,7 @@
                     <m:sSup>
                       <m:sSupPr>
                         <m:ctrlPr>
-                          <a:rPr lang="es-ES" b="0" i="0" dirty="0" smtClean="0">
+                          <a:rPr lang="es-ES" b="0" i="1" dirty="0" smtClean="0">
                             <a:solidFill>
                               <a:schemeClr val="bg1"/>
                             </a:solidFill>
@@ -27594,7 +27650,7 @@
             </p:txBody>
           </p:sp>
         </mc:Choice>
-        <mc:Fallback>
+        <mc:Fallback xmlns="">
           <p:sp>
             <p:nvSpPr>
               <p:cNvPr id="3" name="Marcador de contenido 2">

</xml_diff>